<commit_message>
Nearly ready for DEFENCE
</commit_message>
<xml_diff>
--- a/Презентация.pptx
+++ b/Презентация.pptx
@@ -5,20 +5,22 @@
     <p:sldMasterId id="2147483648" r:id="rId1"/>
   </p:sldMasterIdLst>
   <p:notesMasterIdLst>
-    <p:notesMasterId r:id="rId13"/>
+    <p:notesMasterId r:id="rId15"/>
   </p:notesMasterIdLst>
   <p:sldIdLst>
     <p:sldId id="256" r:id="rId2"/>
-    <p:sldId id="257" r:id="rId3"/>
-    <p:sldId id="258" r:id="rId4"/>
+    <p:sldId id="258" r:id="rId3"/>
+    <p:sldId id="257" r:id="rId4"/>
     <p:sldId id="259" r:id="rId5"/>
     <p:sldId id="260" r:id="rId6"/>
     <p:sldId id="261" r:id="rId7"/>
     <p:sldId id="262" r:id="rId8"/>
     <p:sldId id="265" r:id="rId9"/>
-    <p:sldId id="266" r:id="rId10"/>
-    <p:sldId id="263" r:id="rId11"/>
-    <p:sldId id="264" r:id="rId12"/>
+    <p:sldId id="267" r:id="rId10"/>
+    <p:sldId id="266" r:id="rId11"/>
+    <p:sldId id="268" r:id="rId12"/>
+    <p:sldId id="263" r:id="rId13"/>
+    <p:sldId id="264" r:id="rId14"/>
   </p:sldIdLst>
   <p:sldSz cx="12192000" cy="6858000"/>
   <p:notesSz cx="6858000" cy="9144000"/>
@@ -117,7 +119,24 @@
       </a:defRPr>
     </a:lvl9pPr>
   </p:defaultTextStyle>
+  <p:extLst>
+    <p:ext uri="{EFAFB233-063F-42B5-8137-9DF3F51BA10A}">
+      <p15:sldGuideLst xmlns:p15="http://schemas.microsoft.com/office/powerpoint/2012/main"/>
+    </p:ext>
+  </p:extLst>
 </p:presentation>
+</file>
+
+<file path=ppt/commentAuthors.xml><?xml version="1.0" encoding="utf-8"?>
+<p:cmAuthorLst xmlns:a="http://schemas.openxmlformats.org/drawingml/2006/main" xmlns:r="http://schemas.openxmlformats.org/officeDocument/2006/relationships" xmlns:p="http://schemas.openxmlformats.org/presentationml/2006/main">
+  <p:cmAuthor id="1" name="Egorchik" initials="E" lastIdx="1" clrIdx="0">
+    <p:extLst>
+      <p:ext uri="{19B8F6BF-5375-455C-9EA6-DF929625EA0E}">
+        <p15:presenceInfo xmlns:p15="http://schemas.microsoft.com/office/powerpoint/2012/main" userId="Egorchik" providerId="None"/>
+      </p:ext>
+    </p:extLst>
+  </p:cmAuthor>
+</p:cmAuthorLst>
 </file>
 
 <file path=ppt/notesMasters/notesMaster1.xml><?xml version="1.0" encoding="utf-8"?>
@@ -202,7 +221,7 @@
           <a:p>
             <a:fld id="{54DF9131-75D3-4F83-9D83-954F77C583D0}" type="datetimeFigureOut">
               <a:rPr lang="ru-RU" smtClean="0"/>
-              <a:t>20.06.2019</a:t>
+              <a:t>24.06.2019</a:t>
             </a:fld>
             <a:endParaRPr lang="ru-RU"/>
           </a:p>
@@ -616,7 +635,7 @@
           <a:p>
             <a:fld id="{1FBD8355-A683-41AA-AB01-6B63911354F4}" type="datetime1">
               <a:rPr lang="ru-RU" smtClean="0"/>
-              <a:t>20.06.2019</a:t>
+              <a:t>24.06.2019</a:t>
             </a:fld>
             <a:endParaRPr lang="ru-RU"/>
           </a:p>
@@ -814,7 +833,7 @@
           <a:p>
             <a:fld id="{EE93081A-230D-49D2-8A87-577E53CEE41D}" type="datetime1">
               <a:rPr lang="ru-RU" smtClean="0"/>
-              <a:t>20.06.2019</a:t>
+              <a:t>24.06.2019</a:t>
             </a:fld>
             <a:endParaRPr lang="ru-RU"/>
           </a:p>
@@ -1022,7 +1041,7 @@
           <a:p>
             <a:fld id="{1DF00775-84B5-400B-8B98-DEEBECD27ADD}" type="datetime1">
               <a:rPr lang="ru-RU" smtClean="0"/>
-              <a:t>20.06.2019</a:t>
+              <a:t>24.06.2019</a:t>
             </a:fld>
             <a:endParaRPr lang="ru-RU"/>
           </a:p>
@@ -1220,7 +1239,7 @@
           <a:p>
             <a:fld id="{A184E955-2C3D-42F0-8677-DD4C55AECE72}" type="datetime1">
               <a:rPr lang="ru-RU" smtClean="0"/>
-              <a:t>20.06.2019</a:t>
+              <a:t>24.06.2019</a:t>
             </a:fld>
             <a:endParaRPr lang="ru-RU"/>
           </a:p>
@@ -1495,7 +1514,7 @@
           <a:p>
             <a:fld id="{7B629A27-BAE5-49E0-B416-054970E431B5}" type="datetime1">
               <a:rPr lang="ru-RU" smtClean="0"/>
-              <a:t>20.06.2019</a:t>
+              <a:t>24.06.2019</a:t>
             </a:fld>
             <a:endParaRPr lang="ru-RU"/>
           </a:p>
@@ -1760,7 +1779,7 @@
           <a:p>
             <a:fld id="{812EBB18-0E4C-438E-8088-492875EF5862}" type="datetime1">
               <a:rPr lang="ru-RU" smtClean="0"/>
-              <a:t>20.06.2019</a:t>
+              <a:t>24.06.2019</a:t>
             </a:fld>
             <a:endParaRPr lang="ru-RU"/>
           </a:p>
@@ -2172,7 +2191,7 @@
           <a:p>
             <a:fld id="{81732F73-D4F7-4914-9804-49AC312259AC}" type="datetime1">
               <a:rPr lang="ru-RU" smtClean="0"/>
-              <a:t>20.06.2019</a:t>
+              <a:t>24.06.2019</a:t>
             </a:fld>
             <a:endParaRPr lang="ru-RU"/>
           </a:p>
@@ -2313,7 +2332,7 @@
           <a:p>
             <a:fld id="{0F975E11-57DD-4DFF-BBEF-9ADC2370CFD1}" type="datetime1">
               <a:rPr lang="ru-RU" smtClean="0"/>
-              <a:t>20.06.2019</a:t>
+              <a:t>24.06.2019</a:t>
             </a:fld>
             <a:endParaRPr lang="ru-RU"/>
           </a:p>
@@ -2426,7 +2445,7 @@
           <a:p>
             <a:fld id="{4A1F31B6-B992-4453-9476-0C35154432B0}" type="datetime1">
               <a:rPr lang="ru-RU" smtClean="0"/>
-              <a:t>20.06.2019</a:t>
+              <a:t>24.06.2019</a:t>
             </a:fld>
             <a:endParaRPr lang="ru-RU"/>
           </a:p>
@@ -2737,7 +2756,7 @@
           <a:p>
             <a:fld id="{1572F098-F677-4DBD-A4ED-E5A95084A0EE}" type="datetime1">
               <a:rPr lang="ru-RU" smtClean="0"/>
-              <a:t>20.06.2019</a:t>
+              <a:t>24.06.2019</a:t>
             </a:fld>
             <a:endParaRPr lang="ru-RU"/>
           </a:p>
@@ -3025,7 +3044,7 @@
           <a:p>
             <a:fld id="{584B7714-F5A9-4360-BD8A-65176145A841}" type="datetime1">
               <a:rPr lang="ru-RU" smtClean="0"/>
-              <a:t>20.06.2019</a:t>
+              <a:t>24.06.2019</a:t>
             </a:fld>
             <a:endParaRPr lang="ru-RU"/>
           </a:p>
@@ -3266,7 +3285,7 @@
           <a:p>
             <a:fld id="{9262479C-C231-46B4-B9DC-BCEAC366C8FA}" type="datetime1">
               <a:rPr lang="ru-RU" smtClean="0"/>
-              <a:t>20.06.2019</a:t>
+              <a:t>24.06.2019</a:t>
             </a:fld>
             <a:endParaRPr lang="ru-RU"/>
           </a:p>
@@ -3833,7 +3852,7 @@
           <p:cNvPr id="2" name="Заголовок 1">
             <a:extLst>
               <a:ext uri="{FF2B5EF4-FFF2-40B4-BE49-F238E27FC236}">
-                <a16:creationId xmlns:a16="http://schemas.microsoft.com/office/drawing/2014/main" id="{EAA534B1-ED7F-4940-A24A-CE94162E57E7}"/>
+                <a16:creationId xmlns:a16="http://schemas.microsoft.com/office/drawing/2014/main" id="{0B36A752-C373-491B-8950-FD706736ECAA}"/>
               </a:ext>
             </a:extLst>
           </p:cNvPr>
@@ -3851,77 +3870,8 @@
           <a:p>
             <a:r>
               <a:rPr lang="ru-RU" dirty="0"/>
-              <a:t>Реализация и тестирование</a:t>
-            </a:r>
-          </a:p>
-        </p:txBody>
-      </p:sp>
-      <p:sp>
-        <p:nvSpPr>
-          <p:cNvPr id="3" name="Объект 2">
-            <a:extLst>
-              <a:ext uri="{FF2B5EF4-FFF2-40B4-BE49-F238E27FC236}">
-                <a16:creationId xmlns:a16="http://schemas.microsoft.com/office/drawing/2014/main" id="{38411FBC-919D-4265-810E-D10F1944ED6A}"/>
-              </a:ext>
-            </a:extLst>
-          </p:cNvPr>
-          <p:cNvSpPr>
-            <a:spLocks noGrp="1"/>
-          </p:cNvSpPr>
-          <p:nvPr>
-            <p:ph idx="1"/>
-          </p:nvPr>
-        </p:nvSpPr>
-        <p:spPr/>
-        <p:txBody>
-          <a:bodyPr/>
-          <a:lstStyle/>
-          <a:p>
-            <a:r>
-              <a:rPr lang="ru-RU" dirty="0"/>
-              <a:t>Объем кода: 3338 строк, ~1</a:t>
-            </a:r>
-            <a:r>
-              <a:rPr lang="en-US" dirty="0"/>
-              <a:t>40</a:t>
-            </a:r>
-            <a:r>
-              <a:rPr lang="ru-RU" dirty="0"/>
-              <a:t> кб</a:t>
-            </a:r>
-          </a:p>
-          <a:p>
-            <a:r>
-              <a:rPr lang="ru-RU" dirty="0"/>
-              <a:t>Число коммитов: 46</a:t>
-            </a:r>
-          </a:p>
-          <a:p>
-            <a:r>
-              <a:rPr lang="ru-RU" dirty="0"/>
-              <a:t>Количество </a:t>
-            </a:r>
-            <a:r>
-              <a:rPr lang="ru-RU" dirty="0" err="1"/>
-              <a:t>автотестов</a:t>
-            </a:r>
-            <a:r>
-              <a:rPr lang="ru-RU" dirty="0"/>
-              <a:t>: 63</a:t>
-            </a:r>
-          </a:p>
-          <a:p>
-            <a:r>
-              <a:rPr lang="ru-RU" dirty="0"/>
-              <a:t>Ссылка на репозиторий: </a:t>
-            </a:r>
-            <a:r>
-              <a:rPr lang="en-US" dirty="0"/>
-              <a:t>https://github.com/mrojkov/Citrus</a:t>
-            </a:r>
-          </a:p>
-          <a:p>
-            <a:endParaRPr lang="ru-RU" dirty="0"/>
+              <a:t>Интерфейс</a:t>
+            </a:r>
           </a:p>
         </p:txBody>
       </p:sp>
@@ -3930,7 +3880,7 @@
           <p:cNvPr id="4" name="Номер слайда 3">
             <a:extLst>
               <a:ext uri="{FF2B5EF4-FFF2-40B4-BE49-F238E27FC236}">
-                <a16:creationId xmlns:a16="http://schemas.microsoft.com/office/drawing/2014/main" id="{133DCC61-2869-466F-A3D1-B4E8E6804466}"/>
+                <a16:creationId xmlns:a16="http://schemas.microsoft.com/office/drawing/2014/main" id="{9B87D21D-A744-4FF5-B980-1AB1D28400E1}"/>
               </a:ext>
             </a:extLst>
           </p:cNvPr>
@@ -3950,14 +3900,46 @@
               <a:rPr lang="ru-RU" sz="1800" smtClean="0"/>
               <a:t>10</a:t>
             </a:fld>
-            <a:endParaRPr lang="ru-RU" sz="1800" dirty="0"/>
-          </a:p>
-        </p:txBody>
-      </p:sp>
+            <a:endParaRPr lang="ru-RU" dirty="0"/>
+          </a:p>
+        </p:txBody>
+      </p:sp>
+      <p:pic>
+        <p:nvPicPr>
+          <p:cNvPr id="5" name="Объект 4">
+            <a:extLst>
+              <a:ext uri="{FF2B5EF4-FFF2-40B4-BE49-F238E27FC236}">
+                <a16:creationId xmlns:a16="http://schemas.microsoft.com/office/drawing/2014/main" id="{471ED944-A540-4197-B1B0-A30CE41339FD}"/>
+              </a:ext>
+            </a:extLst>
+          </p:cNvPr>
+          <p:cNvPicPr>
+            <a:picLocks noGrp="1" noChangeAspect="1"/>
+          </p:cNvPicPr>
+          <p:nvPr>
+            <p:ph idx="1"/>
+          </p:nvPr>
+        </p:nvPicPr>
+        <p:blipFill>
+          <a:blip r:embed="rId2"/>
+          <a:stretch>
+            <a:fillRect/>
+          </a:stretch>
+        </p:blipFill>
+        <p:spPr>
+          <a:xfrm>
+            <a:off x="2243580" y="1782233"/>
+            <a:ext cx="7595912" cy="4375376"/>
+          </a:xfrm>
+          <a:prstGeom prst="rect">
+            <a:avLst/>
+          </a:prstGeom>
+        </p:spPr>
+      </p:pic>
     </p:spTree>
     <p:extLst>
       <p:ext uri="{BB962C8B-B14F-4D97-AF65-F5344CB8AC3E}">
-        <p14:creationId xmlns:p14="http://schemas.microsoft.com/office/powerpoint/2010/main" val="909890188"/>
+        <p14:creationId xmlns:p14="http://schemas.microsoft.com/office/powerpoint/2010/main" val="767467962"/>
       </p:ext>
     </p:extLst>
   </p:cSld>
@@ -3989,7 +3971,7 @@
           <p:cNvPr id="2" name="Заголовок 1">
             <a:extLst>
               <a:ext uri="{FF2B5EF4-FFF2-40B4-BE49-F238E27FC236}">
-                <a16:creationId xmlns:a16="http://schemas.microsoft.com/office/drawing/2014/main" id="{17455355-EAE4-41DA-8FF5-F462EDF99648}"/>
+                <a16:creationId xmlns:a16="http://schemas.microsoft.com/office/drawing/2014/main" id="{1E167995-8512-4A3F-98E7-DE2481BAC2B3}"/>
               </a:ext>
             </a:extLst>
           </p:cNvPr>
@@ -4007,59 +3989,7 @@
           <a:p>
             <a:r>
               <a:rPr lang="ru-RU" dirty="0"/>
-              <a:t>Заключение</a:t>
-            </a:r>
-          </a:p>
-        </p:txBody>
-      </p:sp>
-      <p:sp>
-        <p:nvSpPr>
-          <p:cNvPr id="3" name="Объект 2">
-            <a:extLst>
-              <a:ext uri="{FF2B5EF4-FFF2-40B4-BE49-F238E27FC236}">
-                <a16:creationId xmlns:a16="http://schemas.microsoft.com/office/drawing/2014/main" id="{A0CD7AF3-CC4F-4667-B4CA-490FBAD4C717}"/>
-              </a:ext>
-            </a:extLst>
-          </p:cNvPr>
-          <p:cNvSpPr>
-            <a:spLocks noGrp="1"/>
-          </p:cNvSpPr>
-          <p:nvPr>
-            <p:ph idx="1"/>
-          </p:nvPr>
-        </p:nvSpPr>
-        <p:spPr/>
-        <p:txBody>
-          <a:bodyPr/>
-          <a:lstStyle/>
-          <a:p>
-            <a:r>
-              <a:rPr lang="ru-RU" dirty="0"/>
-              <a:t>Выполнен анализ подходов к реализации текстовых процессоров</a:t>
-            </a:r>
-          </a:p>
-          <a:p>
-            <a:r>
-              <a:rPr lang="ru-RU" dirty="0"/>
-              <a:t>Реализованы системы внутренней обработки текста и отрисовки</a:t>
-            </a:r>
-          </a:p>
-          <a:p>
-            <a:r>
-              <a:rPr lang="ru-RU" dirty="0"/>
-              <a:t>Реализованные модули показывают значительное улучшение производительности по сравнению с предыдущей версией процессора</a:t>
-            </a:r>
-          </a:p>
-          <a:p>
-            <a:pPr marL="0" indent="0">
-              <a:buNone/>
-            </a:pPr>
-            <a:endParaRPr lang="ru-RU" dirty="0"/>
-          </a:p>
-          <a:p>
-            <a:r>
-              <a:rPr lang="ru-RU" dirty="0"/>
-              <a:t>До момента защиты дипломной работы планируется доработать модуль обработки пользовательского ввода</a:t>
+              <a:t>Тестирование</a:t>
             </a:r>
           </a:p>
         </p:txBody>
@@ -4069,7 +3999,7 @@
           <p:cNvPr id="4" name="Номер слайда 3">
             <a:extLst>
               <a:ext uri="{FF2B5EF4-FFF2-40B4-BE49-F238E27FC236}">
-                <a16:creationId xmlns:a16="http://schemas.microsoft.com/office/drawing/2014/main" id="{1A44D77B-4AA0-428B-895D-ADED969E7996}"/>
+                <a16:creationId xmlns:a16="http://schemas.microsoft.com/office/drawing/2014/main" id="{2BB44867-35FC-4AF2-BA58-03A0FE38BC79}"/>
               </a:ext>
             </a:extLst>
           </p:cNvPr>
@@ -4088,6 +4018,431 @@
             <a:fld id="{02C6BDC3-5530-4FFE-B683-8EB0AAFDF752}" type="slidenum">
               <a:rPr lang="ru-RU" sz="1800" smtClean="0"/>
               <a:t>11</a:t>
+            </a:fld>
+            <a:endParaRPr lang="ru-RU" dirty="0"/>
+          </a:p>
+        </p:txBody>
+      </p:sp>
+      <p:pic>
+        <p:nvPicPr>
+          <p:cNvPr id="6" name="Рисунок 5">
+            <a:extLst>
+              <a:ext uri="{FF2B5EF4-FFF2-40B4-BE49-F238E27FC236}">
+                <a16:creationId xmlns:a16="http://schemas.microsoft.com/office/drawing/2014/main" id="{5300585B-BE31-4769-851A-CFD08416B812}"/>
+              </a:ext>
+            </a:extLst>
+          </p:cNvPr>
+          <p:cNvPicPr>
+            <a:picLocks noChangeAspect="1"/>
+          </p:cNvPicPr>
+          <p:nvPr/>
+        </p:nvPicPr>
+        <p:blipFill>
+          <a:blip r:embed="rId2"/>
+          <a:stretch>
+            <a:fillRect/>
+          </a:stretch>
+        </p:blipFill>
+        <p:spPr>
+          <a:xfrm>
+            <a:off x="2209245" y="1690688"/>
+            <a:ext cx="7773510" cy="1508293"/>
+          </a:xfrm>
+          <a:prstGeom prst="rect">
+            <a:avLst/>
+          </a:prstGeom>
+        </p:spPr>
+      </p:pic>
+      <p:sp>
+        <p:nvSpPr>
+          <p:cNvPr id="7" name="TextBox 6">
+            <a:extLst>
+              <a:ext uri="{FF2B5EF4-FFF2-40B4-BE49-F238E27FC236}">
+                <a16:creationId xmlns:a16="http://schemas.microsoft.com/office/drawing/2014/main" id="{AF3396A9-EB0F-4339-94E1-DEC3915EF35E}"/>
+              </a:ext>
+            </a:extLst>
+          </p:cNvPr>
+          <p:cNvSpPr txBox="1"/>
+          <p:nvPr/>
+        </p:nvSpPr>
+        <p:spPr>
+          <a:xfrm>
+            <a:off x="2209246" y="3198981"/>
+            <a:ext cx="7274120" cy="707886"/>
+          </a:xfrm>
+          <a:prstGeom prst="rect">
+            <a:avLst/>
+          </a:prstGeom>
+          <a:noFill/>
+        </p:spPr>
+        <p:txBody>
+          <a:bodyPr wrap="square" rtlCol="0">
+            <a:spAutoFit/>
+          </a:bodyPr>
+          <a:lstStyle/>
+          <a:p>
+            <a:pPr algn="ctr"/>
+            <a:r>
+              <a:rPr lang="ru-RU" sz="2000" dirty="0"/>
+              <a:t>Загруженность процессора при активном изменении размеров виджета в предыдущей версии редактора</a:t>
+            </a:r>
+          </a:p>
+        </p:txBody>
+      </p:sp>
+      <p:pic>
+        <p:nvPicPr>
+          <p:cNvPr id="8" name="Рисунок 7">
+            <a:extLst>
+              <a:ext uri="{FF2B5EF4-FFF2-40B4-BE49-F238E27FC236}">
+                <a16:creationId xmlns:a16="http://schemas.microsoft.com/office/drawing/2014/main" id="{45E34F47-4C75-4BDB-87BA-BCC4C7121DA9}"/>
+              </a:ext>
+            </a:extLst>
+          </p:cNvPr>
+          <p:cNvPicPr>
+            <a:picLocks noChangeAspect="1"/>
+          </p:cNvPicPr>
+          <p:nvPr/>
+        </p:nvPicPr>
+        <p:blipFill>
+          <a:blip r:embed="rId3"/>
+          <a:stretch>
+            <a:fillRect/>
+          </a:stretch>
+        </p:blipFill>
+        <p:spPr>
+          <a:xfrm>
+            <a:off x="2209245" y="4100681"/>
+            <a:ext cx="7773510" cy="1395146"/>
+          </a:xfrm>
+          <a:prstGeom prst="rect">
+            <a:avLst/>
+          </a:prstGeom>
+        </p:spPr>
+      </p:pic>
+      <p:sp>
+        <p:nvSpPr>
+          <p:cNvPr id="9" name="TextBox 8">
+            <a:extLst>
+              <a:ext uri="{FF2B5EF4-FFF2-40B4-BE49-F238E27FC236}">
+                <a16:creationId xmlns:a16="http://schemas.microsoft.com/office/drawing/2014/main" id="{8FD05B54-2CCE-44A4-8D67-5049FBE3C6C1}"/>
+              </a:ext>
+            </a:extLst>
+          </p:cNvPr>
+          <p:cNvSpPr txBox="1"/>
+          <p:nvPr/>
+        </p:nvSpPr>
+        <p:spPr>
+          <a:xfrm>
+            <a:off x="2209245" y="5637229"/>
+            <a:ext cx="7274121" cy="707886"/>
+          </a:xfrm>
+          <a:prstGeom prst="rect">
+            <a:avLst/>
+          </a:prstGeom>
+          <a:noFill/>
+        </p:spPr>
+        <p:txBody>
+          <a:bodyPr wrap="square" rtlCol="0">
+            <a:spAutoFit/>
+          </a:bodyPr>
+          <a:lstStyle/>
+          <a:p>
+            <a:pPr algn="ctr"/>
+            <a:r>
+              <a:rPr lang="ru-RU" sz="2000" dirty="0"/>
+              <a:t>Загруженность процессора при активном изменении размеров виджета в новой версии редактора</a:t>
+            </a:r>
+          </a:p>
+        </p:txBody>
+      </p:sp>
+    </p:spTree>
+    <p:extLst>
+      <p:ext uri="{BB962C8B-B14F-4D97-AF65-F5344CB8AC3E}">
+        <p14:creationId xmlns:p14="http://schemas.microsoft.com/office/powerpoint/2010/main" val="594943783"/>
+      </p:ext>
+    </p:extLst>
+  </p:cSld>
+  <p:clrMapOvr>
+    <a:masterClrMapping/>
+  </p:clrMapOvr>
+</p:sld>
+</file>
+
+<file path=ppt/slides/slide12.xml><?xml version="1.0" encoding="utf-8"?>
+<p:sld xmlns:a="http://schemas.openxmlformats.org/drawingml/2006/main" xmlns:r="http://schemas.openxmlformats.org/officeDocument/2006/relationships" xmlns:p="http://schemas.openxmlformats.org/presentationml/2006/main">
+  <p:cSld>
+    <p:spTree>
+      <p:nvGrpSpPr>
+        <p:cNvPr id="1" name=""/>
+        <p:cNvGrpSpPr/>
+        <p:nvPr/>
+      </p:nvGrpSpPr>
+      <p:grpSpPr>
+        <a:xfrm>
+          <a:off x="0" y="0"/>
+          <a:ext cx="0" cy="0"/>
+          <a:chOff x="0" y="0"/>
+          <a:chExt cx="0" cy="0"/>
+        </a:xfrm>
+      </p:grpSpPr>
+      <p:sp>
+        <p:nvSpPr>
+          <p:cNvPr id="2" name="Заголовок 1">
+            <a:extLst>
+              <a:ext uri="{FF2B5EF4-FFF2-40B4-BE49-F238E27FC236}">
+                <a16:creationId xmlns:a16="http://schemas.microsoft.com/office/drawing/2014/main" id="{EAA534B1-ED7F-4940-A24A-CE94162E57E7}"/>
+              </a:ext>
+            </a:extLst>
+          </p:cNvPr>
+          <p:cNvSpPr>
+            <a:spLocks noGrp="1"/>
+          </p:cNvSpPr>
+          <p:nvPr>
+            <p:ph type="title"/>
+          </p:nvPr>
+        </p:nvSpPr>
+        <p:spPr/>
+        <p:txBody>
+          <a:bodyPr/>
+          <a:lstStyle/>
+          <a:p>
+            <a:r>
+              <a:rPr lang="ru-RU" dirty="0"/>
+              <a:t>Реализация</a:t>
+            </a:r>
+          </a:p>
+        </p:txBody>
+      </p:sp>
+      <p:sp>
+        <p:nvSpPr>
+          <p:cNvPr id="3" name="Объект 2">
+            <a:extLst>
+              <a:ext uri="{FF2B5EF4-FFF2-40B4-BE49-F238E27FC236}">
+                <a16:creationId xmlns:a16="http://schemas.microsoft.com/office/drawing/2014/main" id="{38411FBC-919D-4265-810E-D10F1944ED6A}"/>
+              </a:ext>
+            </a:extLst>
+          </p:cNvPr>
+          <p:cNvSpPr>
+            <a:spLocks noGrp="1"/>
+          </p:cNvSpPr>
+          <p:nvPr>
+            <p:ph idx="1"/>
+          </p:nvPr>
+        </p:nvSpPr>
+        <p:spPr/>
+        <p:txBody>
+          <a:bodyPr/>
+          <a:lstStyle/>
+          <a:p>
+            <a:r>
+              <a:rPr lang="ru-RU" dirty="0"/>
+              <a:t>Объем кода: 3338 строк, ~1</a:t>
+            </a:r>
+            <a:r>
+              <a:rPr lang="en-US" dirty="0"/>
+              <a:t>40</a:t>
+            </a:r>
+            <a:r>
+              <a:rPr lang="ru-RU" dirty="0"/>
+              <a:t> кб</a:t>
+            </a:r>
+          </a:p>
+          <a:p>
+            <a:r>
+              <a:rPr lang="ru-RU" dirty="0"/>
+              <a:t>Число коммитов: 46</a:t>
+            </a:r>
+          </a:p>
+          <a:p>
+            <a:r>
+              <a:rPr lang="ru-RU" dirty="0"/>
+              <a:t>Количество </a:t>
+            </a:r>
+            <a:r>
+              <a:rPr lang="ru-RU" dirty="0" err="1"/>
+              <a:t>автотестов</a:t>
+            </a:r>
+            <a:r>
+              <a:rPr lang="ru-RU" dirty="0"/>
+              <a:t>: 63</a:t>
+            </a:r>
+          </a:p>
+          <a:p>
+            <a:r>
+              <a:rPr lang="ru-RU" dirty="0"/>
+              <a:t>Ссылка на репозиторий: </a:t>
+            </a:r>
+            <a:r>
+              <a:rPr lang="en-US" dirty="0"/>
+              <a:t>https://github.com/mrojkov/Citrus</a:t>
+            </a:r>
+          </a:p>
+          <a:p>
+            <a:endParaRPr lang="ru-RU" dirty="0"/>
+          </a:p>
+        </p:txBody>
+      </p:sp>
+      <p:sp>
+        <p:nvSpPr>
+          <p:cNvPr id="4" name="Номер слайда 3">
+            <a:extLst>
+              <a:ext uri="{FF2B5EF4-FFF2-40B4-BE49-F238E27FC236}">
+                <a16:creationId xmlns:a16="http://schemas.microsoft.com/office/drawing/2014/main" id="{133DCC61-2869-466F-A3D1-B4E8E6804466}"/>
+              </a:ext>
+            </a:extLst>
+          </p:cNvPr>
+          <p:cNvSpPr>
+            <a:spLocks noGrp="1"/>
+          </p:cNvSpPr>
+          <p:nvPr>
+            <p:ph type="sldNum" sz="quarter" idx="12"/>
+          </p:nvPr>
+        </p:nvSpPr>
+        <p:spPr/>
+        <p:txBody>
+          <a:bodyPr/>
+          <a:lstStyle/>
+          <a:p>
+            <a:fld id="{02C6BDC3-5530-4FFE-B683-8EB0AAFDF752}" type="slidenum">
+              <a:rPr lang="ru-RU" sz="1800" smtClean="0"/>
+              <a:t>12</a:t>
+            </a:fld>
+            <a:endParaRPr lang="ru-RU" sz="1800" dirty="0"/>
+          </a:p>
+        </p:txBody>
+      </p:sp>
+    </p:spTree>
+    <p:extLst>
+      <p:ext uri="{BB962C8B-B14F-4D97-AF65-F5344CB8AC3E}">
+        <p14:creationId xmlns:p14="http://schemas.microsoft.com/office/powerpoint/2010/main" val="909890188"/>
+      </p:ext>
+    </p:extLst>
+  </p:cSld>
+  <p:clrMapOvr>
+    <a:masterClrMapping/>
+  </p:clrMapOvr>
+</p:sld>
+</file>
+
+<file path=ppt/slides/slide13.xml><?xml version="1.0" encoding="utf-8"?>
+<p:sld xmlns:a="http://schemas.openxmlformats.org/drawingml/2006/main" xmlns:r="http://schemas.openxmlformats.org/officeDocument/2006/relationships" xmlns:p="http://schemas.openxmlformats.org/presentationml/2006/main">
+  <p:cSld>
+    <p:spTree>
+      <p:nvGrpSpPr>
+        <p:cNvPr id="1" name=""/>
+        <p:cNvGrpSpPr/>
+        <p:nvPr/>
+      </p:nvGrpSpPr>
+      <p:grpSpPr>
+        <a:xfrm>
+          <a:off x="0" y="0"/>
+          <a:ext cx="0" cy="0"/>
+          <a:chOff x="0" y="0"/>
+          <a:chExt cx="0" cy="0"/>
+        </a:xfrm>
+      </p:grpSpPr>
+      <p:sp>
+        <p:nvSpPr>
+          <p:cNvPr id="2" name="Заголовок 1">
+            <a:extLst>
+              <a:ext uri="{FF2B5EF4-FFF2-40B4-BE49-F238E27FC236}">
+                <a16:creationId xmlns:a16="http://schemas.microsoft.com/office/drawing/2014/main" id="{17455355-EAE4-41DA-8FF5-F462EDF99648}"/>
+              </a:ext>
+            </a:extLst>
+          </p:cNvPr>
+          <p:cNvSpPr>
+            <a:spLocks noGrp="1"/>
+          </p:cNvSpPr>
+          <p:nvPr>
+            <p:ph type="title"/>
+          </p:nvPr>
+        </p:nvSpPr>
+        <p:spPr/>
+        <p:txBody>
+          <a:bodyPr/>
+          <a:lstStyle/>
+          <a:p>
+            <a:r>
+              <a:rPr lang="ru-RU" dirty="0"/>
+              <a:t>Заключение</a:t>
+            </a:r>
+          </a:p>
+        </p:txBody>
+      </p:sp>
+      <p:sp>
+        <p:nvSpPr>
+          <p:cNvPr id="3" name="Объект 2">
+            <a:extLst>
+              <a:ext uri="{FF2B5EF4-FFF2-40B4-BE49-F238E27FC236}">
+                <a16:creationId xmlns:a16="http://schemas.microsoft.com/office/drawing/2014/main" id="{A0CD7AF3-CC4F-4667-B4CA-490FBAD4C717}"/>
+              </a:ext>
+            </a:extLst>
+          </p:cNvPr>
+          <p:cNvSpPr>
+            <a:spLocks noGrp="1"/>
+          </p:cNvSpPr>
+          <p:nvPr>
+            <p:ph idx="1"/>
+          </p:nvPr>
+        </p:nvSpPr>
+        <p:spPr/>
+        <p:txBody>
+          <a:bodyPr/>
+          <a:lstStyle/>
+          <a:p>
+            <a:pPr lvl="0"/>
+            <a:r>
+              <a:rPr lang="ru-RU" dirty="0"/>
+              <a:t>Выполнен анализ структур данных для работы с текстом</a:t>
+            </a:r>
+          </a:p>
+          <a:p>
+            <a:pPr lvl="0"/>
+            <a:r>
+              <a:rPr lang="ru-RU" dirty="0"/>
+              <a:t>Реализована новая версия текстового процессора</a:t>
+            </a:r>
+          </a:p>
+          <a:p>
+            <a:pPr lvl="0"/>
+            <a:r>
+              <a:rPr lang="ru-RU" dirty="0"/>
+              <a:t>Реализованные модули показывают значительное улучшение производительности по сравнению с предыдущей версией процессора</a:t>
+            </a:r>
+          </a:p>
+          <a:p>
+            <a:pPr lvl="0"/>
+            <a:r>
+              <a:rPr lang="ru-RU" dirty="0"/>
+              <a:t>В настоящий момент код находится на этапе опытной эксплуатации</a:t>
+            </a:r>
+          </a:p>
+        </p:txBody>
+      </p:sp>
+      <p:sp>
+        <p:nvSpPr>
+          <p:cNvPr id="4" name="Номер слайда 3">
+            <a:extLst>
+              <a:ext uri="{FF2B5EF4-FFF2-40B4-BE49-F238E27FC236}">
+                <a16:creationId xmlns:a16="http://schemas.microsoft.com/office/drawing/2014/main" id="{1A44D77B-4AA0-428B-895D-ADED969E7996}"/>
+              </a:ext>
+            </a:extLst>
+          </p:cNvPr>
+          <p:cNvSpPr>
+            <a:spLocks noGrp="1"/>
+          </p:cNvSpPr>
+          <p:nvPr>
+            <p:ph type="sldNum" sz="quarter" idx="12"/>
+          </p:nvPr>
+        </p:nvSpPr>
+        <p:spPr/>
+        <p:txBody>
+          <a:bodyPr/>
+          <a:lstStyle/>
+          <a:p>
+            <a:fld id="{02C6BDC3-5530-4FFE-B683-8EB0AAFDF752}" type="slidenum">
+              <a:rPr lang="ru-RU" sz="1800" smtClean="0"/>
+              <a:t>13</a:t>
             </a:fld>
             <a:endParaRPr lang="ru-RU" sz="1800" dirty="0"/>
           </a:p>
@@ -4128,7 +4483,7 @@
           <p:cNvPr id="2" name="Заголовок 1">
             <a:extLst>
               <a:ext uri="{FF2B5EF4-FFF2-40B4-BE49-F238E27FC236}">
-                <a16:creationId xmlns:a16="http://schemas.microsoft.com/office/drawing/2014/main" id="{29CA0530-729C-4CE9-A2BD-DEB95BE954C7}"/>
+                <a16:creationId xmlns:a16="http://schemas.microsoft.com/office/drawing/2014/main" id="{107EBB1F-A62E-4E4C-BB97-604498719984}"/>
               </a:ext>
             </a:extLst>
           </p:cNvPr>
@@ -4139,59 +4494,294 @@
             <p:ph type="title"/>
           </p:nvPr>
         </p:nvSpPr>
-        <p:spPr/>
-        <p:txBody>
-          <a:bodyPr/>
-          <a:lstStyle/>
-          <a:p>
-            <a:r>
-              <a:rPr lang="ru-RU" dirty="0"/>
-              <a:t>Текстовые процессоры</a:t>
-            </a:r>
+        <p:spPr>
+          <a:xfrm>
+            <a:off x="838200" y="365125"/>
+            <a:ext cx="10515600" cy="1325563"/>
+          </a:xfrm>
+        </p:spPr>
+        <p:txBody>
+          <a:bodyPr/>
+          <a:lstStyle/>
+          <a:p>
+            <a:r>
+              <a:rPr lang="en-US"/>
+              <a:t>Game Forest </a:t>
+            </a:r>
+            <a:r>
+              <a:rPr lang="ru-RU"/>
+              <a:t>и текст</a:t>
+            </a:r>
+            <a:endParaRPr lang="ru-RU" dirty="0"/>
           </a:p>
         </p:txBody>
       </p:sp>
       <p:pic>
         <p:nvPicPr>
-          <p:cNvPr id="5" name="Объект 4" descr="Изображение выглядит как текст&#10;&#10;Автоматически созданное описание">
-            <a:extLst>
-              <a:ext uri="{FF2B5EF4-FFF2-40B4-BE49-F238E27FC236}">
-                <a16:creationId xmlns:a16="http://schemas.microsoft.com/office/drawing/2014/main" id="{A024A5DE-ADA0-49BD-849E-80B229E12283}"/>
+          <p:cNvPr id="11" name="Рисунок 10">
+            <a:extLst>
+              <a:ext uri="{FF2B5EF4-FFF2-40B4-BE49-F238E27FC236}">
+                <a16:creationId xmlns:a16="http://schemas.microsoft.com/office/drawing/2014/main" id="{2978BCD8-AC98-4F34-AB5E-6B06157E0EFB}"/>
               </a:ext>
             </a:extLst>
           </p:cNvPr>
           <p:cNvPicPr>
-            <a:picLocks noGrp="1" noChangeAspect="1"/>
+            <a:picLocks noChangeAspect="1"/>
           </p:cNvPicPr>
-          <p:nvPr>
-            <p:ph idx="1"/>
-          </p:nvPr>
+          <p:nvPr/>
         </p:nvPicPr>
         <p:blipFill>
-          <a:blip r:embed="rId2">
-            <a:extLst>
-              <a:ext uri="{28A0092B-C50C-407E-A947-70E740481C1C}">
-                <a14:useLocalDpi xmlns:a14="http://schemas.microsoft.com/office/drawing/2010/main" val="0"/>
-              </a:ext>
-            </a:extLst>
-          </a:blip>
+          <a:blip r:embed="rId2"/>
           <a:stretch>
             <a:fillRect/>
           </a:stretch>
         </p:blipFill>
         <p:spPr>
           <a:xfrm>
-            <a:off x="922608" y="1690688"/>
-            <a:ext cx="4351338" cy="4351338"/>
+            <a:off x="6631021" y="2133300"/>
+            <a:ext cx="4413121" cy="3755442"/>
+          </a:xfrm>
+          <a:prstGeom prst="rect">
+            <a:avLst/>
+          </a:prstGeom>
+        </p:spPr>
+      </p:pic>
+      <p:sp>
+        <p:nvSpPr>
+          <p:cNvPr id="12" name="Номер слайда 11">
+            <a:extLst>
+              <a:ext uri="{FF2B5EF4-FFF2-40B4-BE49-F238E27FC236}">
+                <a16:creationId xmlns:a16="http://schemas.microsoft.com/office/drawing/2014/main" id="{FD42D20C-DE7D-4E18-9A7A-09E4B12CB671}"/>
+              </a:ext>
+            </a:extLst>
+          </p:cNvPr>
+          <p:cNvSpPr>
+            <a:spLocks noGrp="1"/>
+          </p:cNvSpPr>
+          <p:nvPr>
+            <p:ph type="sldNum" sz="quarter" idx="12"/>
+          </p:nvPr>
+        </p:nvSpPr>
+        <p:spPr>
+          <a:xfrm>
+            <a:off x="8610600" y="6356350"/>
+            <a:ext cx="2743200" cy="365125"/>
           </a:xfrm>
         </p:spPr>
-      </p:pic>
+        <p:txBody>
+          <a:bodyPr/>
+          <a:lstStyle/>
+          <a:p>
+            <a:fld id="{02C6BDC3-5530-4FFE-B683-8EB0AAFDF752}" type="slidenum">
+              <a:rPr lang="ru-RU" sz="1800" smtClean="0"/>
+              <a:t>2</a:t>
+            </a:fld>
+            <a:endParaRPr lang="ru-RU" sz="1800" dirty="0"/>
+          </a:p>
+        </p:txBody>
+      </p:sp>
+      <p:sp>
+        <p:nvSpPr>
+          <p:cNvPr id="9" name="Объект 3">
+            <a:extLst>
+              <a:ext uri="{FF2B5EF4-FFF2-40B4-BE49-F238E27FC236}">
+                <a16:creationId xmlns:a16="http://schemas.microsoft.com/office/drawing/2014/main" id="{37CEFD2E-1714-49B2-A7BF-C318C43ADAC0}"/>
+              </a:ext>
+            </a:extLst>
+          </p:cNvPr>
+          <p:cNvSpPr txBox="1">
+            <a:spLocks/>
+          </p:cNvSpPr>
+          <p:nvPr/>
+        </p:nvSpPr>
+        <p:spPr>
+          <a:xfrm>
+            <a:off x="838200" y="1835352"/>
+            <a:ext cx="10515600" cy="4351338"/>
+          </a:xfrm>
+          <a:prstGeom prst="rect">
+            <a:avLst/>
+          </a:prstGeom>
+        </p:spPr>
+        <p:txBody>
+          <a:bodyPr vert="horz" lIns="91440" tIns="45720" rIns="91440" bIns="45720" rtlCol="0">
+            <a:normAutofit/>
+          </a:bodyPr>
+          <a:lstStyle>
+            <a:lvl1pPr marL="228600" indent="-228600" algn="l" defTabSz="914400" rtl="0" eaLnBrk="1" latinLnBrk="0" hangingPunct="1">
+              <a:lnSpc>
+                <a:spcPct val="90000"/>
+              </a:lnSpc>
+              <a:spcBef>
+                <a:spcPts val="1000"/>
+              </a:spcBef>
+              <a:buFont typeface="Arial" panose="020B0604020202020204" pitchFamily="34" charset="0"/>
+              <a:buChar char="•"/>
+              <a:defRPr sz="2800" kern="1200">
+                <a:solidFill>
+                  <a:schemeClr val="tx1"/>
+                </a:solidFill>
+                <a:latin typeface="+mn-lt"/>
+                <a:ea typeface="+mn-ea"/>
+                <a:cs typeface="+mn-cs"/>
+              </a:defRPr>
+            </a:lvl1pPr>
+            <a:lvl2pPr marL="685800" indent="-228600" algn="l" defTabSz="914400" rtl="0" eaLnBrk="1" latinLnBrk="0" hangingPunct="1">
+              <a:lnSpc>
+                <a:spcPct val="90000"/>
+              </a:lnSpc>
+              <a:spcBef>
+                <a:spcPts val="500"/>
+              </a:spcBef>
+              <a:buFont typeface="Arial" panose="020B0604020202020204" pitchFamily="34" charset="0"/>
+              <a:buChar char="•"/>
+              <a:defRPr sz="2400" kern="1200">
+                <a:solidFill>
+                  <a:schemeClr val="tx1"/>
+                </a:solidFill>
+                <a:latin typeface="+mn-lt"/>
+                <a:ea typeface="+mn-ea"/>
+                <a:cs typeface="+mn-cs"/>
+              </a:defRPr>
+            </a:lvl2pPr>
+            <a:lvl3pPr marL="1143000" indent="-228600" algn="l" defTabSz="914400" rtl="0" eaLnBrk="1" latinLnBrk="0" hangingPunct="1">
+              <a:lnSpc>
+                <a:spcPct val="90000"/>
+              </a:lnSpc>
+              <a:spcBef>
+                <a:spcPts val="500"/>
+              </a:spcBef>
+              <a:buFont typeface="Arial" panose="020B0604020202020204" pitchFamily="34" charset="0"/>
+              <a:buChar char="•"/>
+              <a:defRPr sz="2000" kern="1200">
+                <a:solidFill>
+                  <a:schemeClr val="tx1"/>
+                </a:solidFill>
+                <a:latin typeface="+mn-lt"/>
+                <a:ea typeface="+mn-ea"/>
+                <a:cs typeface="+mn-cs"/>
+              </a:defRPr>
+            </a:lvl3pPr>
+            <a:lvl4pPr marL="1600200" indent="-228600" algn="l" defTabSz="914400" rtl="0" eaLnBrk="1" latinLnBrk="0" hangingPunct="1">
+              <a:lnSpc>
+                <a:spcPct val="90000"/>
+              </a:lnSpc>
+              <a:spcBef>
+                <a:spcPts val="500"/>
+              </a:spcBef>
+              <a:buFont typeface="Arial" panose="020B0604020202020204" pitchFamily="34" charset="0"/>
+              <a:buChar char="•"/>
+              <a:defRPr sz="1800" kern="1200">
+                <a:solidFill>
+                  <a:schemeClr val="tx1"/>
+                </a:solidFill>
+                <a:latin typeface="+mn-lt"/>
+                <a:ea typeface="+mn-ea"/>
+                <a:cs typeface="+mn-cs"/>
+              </a:defRPr>
+            </a:lvl4pPr>
+            <a:lvl5pPr marL="2057400" indent="-228600" algn="l" defTabSz="914400" rtl="0" eaLnBrk="1" latinLnBrk="0" hangingPunct="1">
+              <a:lnSpc>
+                <a:spcPct val="90000"/>
+              </a:lnSpc>
+              <a:spcBef>
+                <a:spcPts val="500"/>
+              </a:spcBef>
+              <a:buFont typeface="Arial" panose="020B0604020202020204" pitchFamily="34" charset="0"/>
+              <a:buChar char="•"/>
+              <a:defRPr sz="1800" kern="1200">
+                <a:solidFill>
+                  <a:schemeClr val="tx1"/>
+                </a:solidFill>
+                <a:latin typeface="+mn-lt"/>
+                <a:ea typeface="+mn-ea"/>
+                <a:cs typeface="+mn-cs"/>
+              </a:defRPr>
+            </a:lvl5pPr>
+            <a:lvl6pPr marL="2514600" indent="-228600" algn="l" defTabSz="914400" rtl="0" eaLnBrk="1" latinLnBrk="0" hangingPunct="1">
+              <a:lnSpc>
+                <a:spcPct val="90000"/>
+              </a:lnSpc>
+              <a:spcBef>
+                <a:spcPts val="500"/>
+              </a:spcBef>
+              <a:buFont typeface="Arial" panose="020B0604020202020204" pitchFamily="34" charset="0"/>
+              <a:buChar char="•"/>
+              <a:defRPr sz="1800" kern="1200">
+                <a:solidFill>
+                  <a:schemeClr val="tx1"/>
+                </a:solidFill>
+                <a:latin typeface="+mn-lt"/>
+                <a:ea typeface="+mn-ea"/>
+                <a:cs typeface="+mn-cs"/>
+              </a:defRPr>
+            </a:lvl6pPr>
+            <a:lvl7pPr marL="2971800" indent="-228600" algn="l" defTabSz="914400" rtl="0" eaLnBrk="1" latinLnBrk="0" hangingPunct="1">
+              <a:lnSpc>
+                <a:spcPct val="90000"/>
+              </a:lnSpc>
+              <a:spcBef>
+                <a:spcPts val="500"/>
+              </a:spcBef>
+              <a:buFont typeface="Arial" panose="020B0604020202020204" pitchFamily="34" charset="0"/>
+              <a:buChar char="•"/>
+              <a:defRPr sz="1800" kern="1200">
+                <a:solidFill>
+                  <a:schemeClr val="tx1"/>
+                </a:solidFill>
+                <a:latin typeface="+mn-lt"/>
+                <a:ea typeface="+mn-ea"/>
+                <a:cs typeface="+mn-cs"/>
+              </a:defRPr>
+            </a:lvl7pPr>
+            <a:lvl8pPr marL="3429000" indent="-228600" algn="l" defTabSz="914400" rtl="0" eaLnBrk="1" latinLnBrk="0" hangingPunct="1">
+              <a:lnSpc>
+                <a:spcPct val="90000"/>
+              </a:lnSpc>
+              <a:spcBef>
+                <a:spcPts val="500"/>
+              </a:spcBef>
+              <a:buFont typeface="Arial" panose="020B0604020202020204" pitchFamily="34" charset="0"/>
+              <a:buChar char="•"/>
+              <a:defRPr sz="1800" kern="1200">
+                <a:solidFill>
+                  <a:schemeClr val="tx1"/>
+                </a:solidFill>
+                <a:latin typeface="+mn-lt"/>
+                <a:ea typeface="+mn-ea"/>
+                <a:cs typeface="+mn-cs"/>
+              </a:defRPr>
+            </a:lvl8pPr>
+            <a:lvl9pPr marL="3886200" indent="-228600" algn="l" defTabSz="914400" rtl="0" eaLnBrk="1" latinLnBrk="0" hangingPunct="1">
+              <a:lnSpc>
+                <a:spcPct val="90000"/>
+              </a:lnSpc>
+              <a:spcBef>
+                <a:spcPts val="500"/>
+              </a:spcBef>
+              <a:buFont typeface="Arial" panose="020B0604020202020204" pitchFamily="34" charset="0"/>
+              <a:buChar char="•"/>
+              <a:defRPr sz="1800" kern="1200">
+                <a:solidFill>
+                  <a:schemeClr val="tx1"/>
+                </a:solidFill>
+                <a:latin typeface="+mn-lt"/>
+                <a:ea typeface="+mn-ea"/>
+                <a:cs typeface="+mn-cs"/>
+              </a:defRPr>
+            </a:lvl9pPr>
+          </a:lstStyle>
+          <a:p>
+            <a:endParaRPr lang="ru-RU"/>
+          </a:p>
+        </p:txBody>
+      </p:sp>
       <p:pic>
         <p:nvPicPr>
-          <p:cNvPr id="7" name="Рисунок 6">
-            <a:extLst>
-              <a:ext uri="{FF2B5EF4-FFF2-40B4-BE49-F238E27FC236}">
-                <a16:creationId xmlns:a16="http://schemas.microsoft.com/office/drawing/2014/main" id="{5C2903C0-D87C-49C9-B2A2-CB0D3159522B}"/>
+          <p:cNvPr id="13" name="Рисунок 12">
+            <a:extLst>
+              <a:ext uri="{FF2B5EF4-FFF2-40B4-BE49-F238E27FC236}">
+                <a16:creationId xmlns:a16="http://schemas.microsoft.com/office/drawing/2014/main" id="{7413545A-BB6D-40AD-9CB9-13C4F997B0E5}"/>
               </a:ext>
             </a:extLst>
           </p:cNvPr>
@@ -4201,60 +4791,25 @@
           <p:nvPr/>
         </p:nvPicPr>
         <p:blipFill>
-          <a:blip r:embed="rId3">
-            <a:extLst>
-              <a:ext uri="{28A0092B-C50C-407E-A947-70E740481C1C}">
-                <a14:useLocalDpi xmlns:a14="http://schemas.microsoft.com/office/drawing/2010/main" val="0"/>
-              </a:ext>
-            </a:extLst>
-          </a:blip>
+          <a:blip r:embed="rId3"/>
           <a:stretch>
             <a:fillRect/>
           </a:stretch>
         </p:blipFill>
         <p:spPr>
           <a:xfrm>
-            <a:off x="6685794" y="1716268"/>
-            <a:ext cx="4351339" cy="4325758"/>
+            <a:off x="478276" y="2782296"/>
+            <a:ext cx="5457825" cy="2457450"/>
           </a:xfrm>
           <a:prstGeom prst="rect">
             <a:avLst/>
           </a:prstGeom>
         </p:spPr>
       </p:pic>
-      <p:sp>
-        <p:nvSpPr>
-          <p:cNvPr id="8" name="Номер слайда 7">
-            <a:extLst>
-              <a:ext uri="{FF2B5EF4-FFF2-40B4-BE49-F238E27FC236}">
-                <a16:creationId xmlns:a16="http://schemas.microsoft.com/office/drawing/2014/main" id="{22E3234E-C290-4798-B929-38ADA9DEA4D7}"/>
-              </a:ext>
-            </a:extLst>
-          </p:cNvPr>
-          <p:cNvSpPr>
-            <a:spLocks noGrp="1"/>
-          </p:cNvSpPr>
-          <p:nvPr>
-            <p:ph type="sldNum" sz="quarter" idx="12"/>
-          </p:nvPr>
-        </p:nvSpPr>
-        <p:spPr/>
-        <p:txBody>
-          <a:bodyPr/>
-          <a:lstStyle/>
-          <a:p>
-            <a:fld id="{02C6BDC3-5530-4FFE-B683-8EB0AAFDF752}" type="slidenum">
-              <a:rPr lang="ru-RU" sz="1800" smtClean="0"/>
-              <a:t>2</a:t>
-            </a:fld>
-            <a:endParaRPr lang="ru-RU" sz="1800" dirty="0"/>
-          </a:p>
-        </p:txBody>
-      </p:sp>
     </p:spTree>
     <p:extLst>
       <p:ext uri="{BB962C8B-B14F-4D97-AF65-F5344CB8AC3E}">
-        <p14:creationId xmlns:p14="http://schemas.microsoft.com/office/powerpoint/2010/main" val="2720754720"/>
+        <p14:creationId xmlns:p14="http://schemas.microsoft.com/office/powerpoint/2010/main" val="277494569"/>
       </p:ext>
     </p:extLst>
   </p:cSld>
@@ -4286,7 +4841,7 @@
           <p:cNvPr id="2" name="Заголовок 1">
             <a:extLst>
               <a:ext uri="{FF2B5EF4-FFF2-40B4-BE49-F238E27FC236}">
-                <a16:creationId xmlns:a16="http://schemas.microsoft.com/office/drawing/2014/main" id="{107EBB1F-A62E-4E4C-BB97-604498719984}"/>
+                <a16:creationId xmlns:a16="http://schemas.microsoft.com/office/drawing/2014/main" id="{29CA0530-729C-4CE9-A2BD-DEB95BE954C7}"/>
               </a:ext>
             </a:extLst>
           </p:cNvPr>
@@ -4303,22 +4858,18 @@
           <a:lstStyle/>
           <a:p>
             <a:r>
-              <a:rPr lang="en-US" dirty="0"/>
-              <a:t>Game Forest </a:t>
-            </a:r>
-            <a:r>
               <a:rPr lang="ru-RU" dirty="0"/>
-              <a:t>и текст</a:t>
+              <a:t>Текстовые процессоры</a:t>
             </a:r>
           </a:p>
         </p:txBody>
       </p:sp>
       <p:pic>
         <p:nvPicPr>
-          <p:cNvPr id="10" name="Объект 9" descr="Изображение выглядит как контейнер&#10;&#10;Автоматически созданное описание">
-            <a:extLst>
-              <a:ext uri="{FF2B5EF4-FFF2-40B4-BE49-F238E27FC236}">
-                <a16:creationId xmlns:a16="http://schemas.microsoft.com/office/drawing/2014/main" id="{2404A23C-FE10-450C-9A00-134A2B220F97}"/>
+          <p:cNvPr id="5" name="Объект 4" descr="Изображение выглядит как текст&#10;&#10;Автоматически созданное описание">
+            <a:extLst>
+              <a:ext uri="{FF2B5EF4-FFF2-40B4-BE49-F238E27FC236}">
+                <a16:creationId xmlns:a16="http://schemas.microsoft.com/office/drawing/2014/main" id="{A024A5DE-ADA0-49BD-849E-80B229E12283}"/>
               </a:ext>
             </a:extLst>
           </p:cNvPr>
@@ -4343,17 +4894,17 @@
         </p:blipFill>
         <p:spPr>
           <a:xfrm>
-            <a:off x="838200" y="1545160"/>
-            <a:ext cx="4413121" cy="4351338"/>
+            <a:off x="922608" y="1690688"/>
+            <a:ext cx="4351338" cy="4351338"/>
           </a:xfrm>
         </p:spPr>
       </p:pic>
       <p:pic>
         <p:nvPicPr>
-          <p:cNvPr id="11" name="Рисунок 10">
-            <a:extLst>
-              <a:ext uri="{FF2B5EF4-FFF2-40B4-BE49-F238E27FC236}">
-                <a16:creationId xmlns:a16="http://schemas.microsoft.com/office/drawing/2014/main" id="{2978BCD8-AC98-4F34-AB5E-6B06157E0EFB}"/>
+          <p:cNvPr id="7" name="Рисунок 6">
+            <a:extLst>
+              <a:ext uri="{FF2B5EF4-FFF2-40B4-BE49-F238E27FC236}">
+                <a16:creationId xmlns:a16="http://schemas.microsoft.com/office/drawing/2014/main" id="{5C2903C0-D87C-49C9-B2A2-CB0D3159522B}"/>
               </a:ext>
             </a:extLst>
           </p:cNvPr>
@@ -4363,15 +4914,21 @@
           <p:nvPr/>
         </p:nvPicPr>
         <p:blipFill>
-          <a:blip r:embed="rId3"/>
+          <a:blip r:embed="rId3">
+            <a:extLst>
+              <a:ext uri="{28A0092B-C50C-407E-A947-70E740481C1C}">
+                <a14:useLocalDpi xmlns:a14="http://schemas.microsoft.com/office/drawing/2010/main" val="0"/>
+              </a:ext>
+            </a:extLst>
+          </a:blip>
           <a:stretch>
             <a:fillRect/>
           </a:stretch>
         </p:blipFill>
         <p:spPr>
           <a:xfrm>
-            <a:off x="6096000" y="2141056"/>
-            <a:ext cx="4413121" cy="3755442"/>
+            <a:off x="6685794" y="1716268"/>
+            <a:ext cx="4351339" cy="4325758"/>
           </a:xfrm>
           <a:prstGeom prst="rect">
             <a:avLst/>
@@ -4380,10 +4937,10 @@
       </p:pic>
       <p:sp>
         <p:nvSpPr>
-          <p:cNvPr id="12" name="Номер слайда 11">
-            <a:extLst>
-              <a:ext uri="{FF2B5EF4-FFF2-40B4-BE49-F238E27FC236}">
-                <a16:creationId xmlns:a16="http://schemas.microsoft.com/office/drawing/2014/main" id="{FD42D20C-DE7D-4E18-9A7A-09E4B12CB671}"/>
+          <p:cNvPr id="8" name="Номер слайда 7">
+            <a:extLst>
+              <a:ext uri="{FF2B5EF4-FFF2-40B4-BE49-F238E27FC236}">
+                <a16:creationId xmlns:a16="http://schemas.microsoft.com/office/drawing/2014/main" id="{22E3234E-C290-4798-B929-38ADA9DEA4D7}"/>
               </a:ext>
             </a:extLst>
           </p:cNvPr>
@@ -4410,7 +4967,7 @@
     </p:spTree>
     <p:extLst>
       <p:ext uri="{BB962C8B-B14F-4D97-AF65-F5344CB8AC3E}">
-        <p14:creationId xmlns:p14="http://schemas.microsoft.com/office/powerpoint/2010/main" val="277494569"/>
+        <p14:creationId xmlns:p14="http://schemas.microsoft.com/office/powerpoint/2010/main" val="2720754720"/>
       </p:ext>
     </p:extLst>
   </p:cSld>
@@ -4520,7 +5077,7 @@
           <a:p>
             <a:r>
               <a:rPr lang="ru-RU" dirty="0"/>
-              <a:t>Изучить подходы к реализации</a:t>
+              <a:t>Изучить эффективные методы представления текста</a:t>
             </a:r>
           </a:p>
           <a:p>
@@ -4532,7 +5089,7 @@
           <a:p>
             <a:r>
               <a:rPr lang="ru-RU" dirty="0"/>
-              <a:t>Убедиться в наличии положительного эффекта</a:t>
+              <a:t>Оценить выигрыш в производительности</a:t>
             </a:r>
             <a:endParaRPr lang="en-US" dirty="0"/>
           </a:p>
@@ -4619,24 +5176,64 @@
             <p:ph type="title"/>
           </p:nvPr>
         </p:nvSpPr>
-        <p:spPr/>
-        <p:txBody>
-          <a:bodyPr/>
-          <a:lstStyle/>
-          <a:p>
-            <a:r>
-              <a:rPr lang="ru-RU" dirty="0"/>
+        <p:spPr>
+          <a:xfrm>
+            <a:off x="838200" y="365125"/>
+            <a:ext cx="10515600" cy="1325563"/>
+          </a:xfrm>
+        </p:spPr>
+        <p:txBody>
+          <a:bodyPr/>
+          <a:lstStyle/>
+          <a:p>
+            <a:r>
+              <a:rPr lang="ru-RU"/>
               <a:t>Структуры данных</a:t>
             </a:r>
+            <a:endParaRPr lang="ru-RU" dirty="0"/>
+          </a:p>
+        </p:txBody>
+      </p:sp>
+      <p:sp>
+        <p:nvSpPr>
+          <p:cNvPr id="5" name="Номер слайда 4">
+            <a:extLst>
+              <a:ext uri="{FF2B5EF4-FFF2-40B4-BE49-F238E27FC236}">
+                <a16:creationId xmlns:a16="http://schemas.microsoft.com/office/drawing/2014/main" id="{75E896EF-F91F-4AAE-9B1F-B65112F3886E}"/>
+              </a:ext>
+            </a:extLst>
+          </p:cNvPr>
+          <p:cNvSpPr>
+            <a:spLocks noGrp="1"/>
+          </p:cNvSpPr>
+          <p:nvPr>
+            <p:ph type="sldNum" sz="quarter" idx="12"/>
+          </p:nvPr>
+        </p:nvSpPr>
+        <p:spPr>
+          <a:xfrm>
+            <a:off x="8610600" y="6356350"/>
+            <a:ext cx="2743200" cy="365125"/>
+          </a:xfrm>
+        </p:spPr>
+        <p:txBody>
+          <a:bodyPr/>
+          <a:lstStyle/>
+          <a:p>
+            <a:fld id="{02C6BDC3-5530-4FFE-B683-8EB0AAFDF752}" type="slidenum">
+              <a:rPr lang="ru-RU" sz="1800" smtClean="0"/>
+              <a:t>5</a:t>
+            </a:fld>
+            <a:endParaRPr lang="ru-RU" sz="1800" dirty="0"/>
           </a:p>
         </p:txBody>
       </p:sp>
       <p:pic>
         <p:nvPicPr>
-          <p:cNvPr id="4" name="Объект 3">
-            <a:extLst>
-              <a:ext uri="{FF2B5EF4-FFF2-40B4-BE49-F238E27FC236}">
-                <a16:creationId xmlns:a16="http://schemas.microsoft.com/office/drawing/2014/main" id="{7D80E644-2140-4313-86CE-A52224775F73}"/>
+          <p:cNvPr id="7" name="Объект 6">
+            <a:extLst>
+              <a:ext uri="{FF2B5EF4-FFF2-40B4-BE49-F238E27FC236}">
+                <a16:creationId xmlns:a16="http://schemas.microsoft.com/office/drawing/2014/main" id="{C0C270E6-F14C-428B-B1BB-404FE6163F9A}"/>
               </a:ext>
             </a:extLst>
           </p:cNvPr>
@@ -4655,43 +5252,14 @@
         </p:blipFill>
         <p:spPr>
           <a:xfrm>
-            <a:off x="2028825" y="2258219"/>
-            <a:ext cx="8134350" cy="3486150"/>
+            <a:off x="2378937" y="1853905"/>
+            <a:ext cx="7434126" cy="4351338"/>
           </a:xfrm>
           <a:prstGeom prst="rect">
             <a:avLst/>
           </a:prstGeom>
         </p:spPr>
       </p:pic>
-      <p:sp>
-        <p:nvSpPr>
-          <p:cNvPr id="5" name="Номер слайда 4">
-            <a:extLst>
-              <a:ext uri="{FF2B5EF4-FFF2-40B4-BE49-F238E27FC236}">
-                <a16:creationId xmlns:a16="http://schemas.microsoft.com/office/drawing/2014/main" id="{75E896EF-F91F-4AAE-9B1F-B65112F3886E}"/>
-              </a:ext>
-            </a:extLst>
-          </p:cNvPr>
-          <p:cNvSpPr>
-            <a:spLocks noGrp="1"/>
-          </p:cNvSpPr>
-          <p:nvPr>
-            <p:ph type="sldNum" sz="quarter" idx="12"/>
-          </p:nvPr>
-        </p:nvSpPr>
-        <p:spPr/>
-        <p:txBody>
-          <a:bodyPr/>
-          <a:lstStyle/>
-          <a:p>
-            <a:fld id="{02C6BDC3-5530-4FFE-B683-8EB0AAFDF752}" type="slidenum">
-              <a:rPr lang="ru-RU" sz="1800" smtClean="0"/>
-              <a:t>5</a:t>
-            </a:fld>
-            <a:endParaRPr lang="ru-RU" sz="1800" dirty="0"/>
-          </a:p>
-        </p:txBody>
-      </p:sp>
     </p:spTree>
     <p:extLst>
       <p:ext uri="{BB962C8B-B14F-4D97-AF65-F5344CB8AC3E}">
@@ -4774,19 +5342,19 @@
           <a:lstStyle/>
           <a:p>
             <a:r>
-              <a:rPr lang="ru-RU" sz="3600" dirty="0"/>
+              <a:rPr lang="ru-RU" sz="3200" dirty="0"/>
               <a:t>Эффективная обработка внутреннего представления текста</a:t>
             </a:r>
           </a:p>
           <a:p>
             <a:r>
-              <a:rPr lang="ru-RU" sz="3600" dirty="0"/>
-              <a:t>Отрисовка текста с заданными параметрами </a:t>
-            </a:r>
-          </a:p>
-          <a:p>
-            <a:r>
-              <a:rPr lang="ru-RU" sz="3600" dirty="0"/>
+              <a:rPr lang="ru-RU" sz="3200" dirty="0"/>
+              <a:t>Отрисовка текста с заданными параметрами шрифта</a:t>
+            </a:r>
+          </a:p>
+          <a:p>
+            <a:r>
+              <a:rPr lang="ru-RU" sz="3200" dirty="0"/>
               <a:t>Обработка пользовательского ввода</a:t>
             </a:r>
           </a:p>
@@ -4867,70 +5435,20 @@
             <p:ph type="title"/>
           </p:nvPr>
         </p:nvSpPr>
-        <p:spPr/>
-        <p:txBody>
-          <a:bodyPr/>
-          <a:lstStyle/>
-          <a:p>
-            <a:r>
-              <a:rPr lang="ru-RU" dirty="0"/>
+        <p:spPr>
+          <a:xfrm>
+            <a:off x="838200" y="365125"/>
+            <a:ext cx="10515600" cy="1325563"/>
+          </a:xfrm>
+        </p:spPr>
+        <p:txBody>
+          <a:bodyPr/>
+          <a:lstStyle/>
+          <a:p>
+            <a:r>
+              <a:rPr lang="ru-RU"/>
               <a:t>Архитектура системы</a:t>
             </a:r>
-          </a:p>
-        </p:txBody>
-      </p:sp>
-      <p:sp>
-        <p:nvSpPr>
-          <p:cNvPr id="3" name="Объект 2">
-            <a:extLst>
-              <a:ext uri="{FF2B5EF4-FFF2-40B4-BE49-F238E27FC236}">
-                <a16:creationId xmlns:a16="http://schemas.microsoft.com/office/drawing/2014/main" id="{F1855E83-0D23-4F11-B392-7E51D977888B}"/>
-              </a:ext>
-            </a:extLst>
-          </p:cNvPr>
-          <p:cNvSpPr>
-            <a:spLocks noGrp="1"/>
-          </p:cNvSpPr>
-          <p:nvPr>
-            <p:ph idx="1"/>
-          </p:nvPr>
-        </p:nvSpPr>
-        <p:spPr/>
-        <p:txBody>
-          <a:bodyPr/>
-          <a:lstStyle/>
-          <a:p>
-            <a:pPr marL="0" indent="0">
-              <a:buNone/>
-            </a:pPr>
-            <a:r>
-              <a:rPr lang="ru-RU" sz="3200" dirty="0"/>
-              <a:t>Система состоит из следующих модулей</a:t>
-            </a:r>
-            <a:r>
-              <a:rPr lang="en-US" sz="3200" dirty="0"/>
-              <a:t>:</a:t>
-            </a:r>
-          </a:p>
-          <a:p>
-            <a:r>
-              <a:rPr lang="ru-RU" sz="3200" dirty="0"/>
-              <a:t>Модуль обработки внутреннего представления текста</a:t>
-            </a:r>
-          </a:p>
-          <a:p>
-            <a:r>
-              <a:rPr lang="ru-RU" sz="3200" dirty="0"/>
-              <a:t>Модуль отрисовки</a:t>
-            </a:r>
-          </a:p>
-          <a:p>
-            <a:r>
-              <a:rPr lang="ru-RU" sz="3200" dirty="0"/>
-              <a:t>Модуль обработки пользовательского ввода</a:t>
-            </a:r>
-          </a:p>
-          <a:p>
             <a:endParaRPr lang="ru-RU" dirty="0"/>
           </a:p>
         </p:txBody>
@@ -4951,7 +5469,12 @@
             <p:ph type="sldNum" sz="quarter" idx="12"/>
           </p:nvPr>
         </p:nvSpPr>
-        <p:spPr/>
+        <p:spPr>
+          <a:xfrm>
+            <a:off x="8610600" y="6356350"/>
+            <a:ext cx="2743200" cy="365125"/>
+          </a:xfrm>
+        </p:spPr>
         <p:txBody>
           <a:bodyPr/>
           <a:lstStyle/>
@@ -4961,6 +5484,222 @@
               <a:t>7</a:t>
             </a:fld>
             <a:endParaRPr lang="ru-RU" sz="1800" dirty="0"/>
+          </a:p>
+        </p:txBody>
+      </p:sp>
+      <p:pic>
+        <p:nvPicPr>
+          <p:cNvPr id="5" name="Рисунок 4" descr="Изображение выглядит как снимок экрана&#10;&#10;Автоматически созданное описание">
+            <a:extLst>
+              <a:ext uri="{FF2B5EF4-FFF2-40B4-BE49-F238E27FC236}">
+                <a16:creationId xmlns:a16="http://schemas.microsoft.com/office/drawing/2014/main" id="{E7647C60-E55E-458B-827A-7122A0BC4E92}"/>
+              </a:ext>
+            </a:extLst>
+          </p:cNvPr>
+          <p:cNvPicPr>
+            <a:picLocks noChangeAspect="1"/>
+          </p:cNvPicPr>
+          <p:nvPr/>
+        </p:nvPicPr>
+        <p:blipFill>
+          <a:blip r:embed="rId2">
+            <a:extLst>
+              <a:ext uri="{28A0092B-C50C-407E-A947-70E740481C1C}">
+                <a14:useLocalDpi xmlns:a14="http://schemas.microsoft.com/office/drawing/2010/main" val="0"/>
+              </a:ext>
+            </a:extLst>
+          </a:blip>
+          <a:stretch>
+            <a:fillRect/>
+          </a:stretch>
+        </p:blipFill>
+        <p:spPr>
+          <a:xfrm>
+            <a:off x="838200" y="1831097"/>
+            <a:ext cx="4829175" cy="4010025"/>
+          </a:xfrm>
+          <a:prstGeom prst="rect">
+            <a:avLst/>
+          </a:prstGeom>
+        </p:spPr>
+      </p:pic>
+      <p:sp>
+        <p:nvSpPr>
+          <p:cNvPr id="9" name="TextBox 8">
+            <a:extLst>
+              <a:ext uri="{FF2B5EF4-FFF2-40B4-BE49-F238E27FC236}">
+                <a16:creationId xmlns:a16="http://schemas.microsoft.com/office/drawing/2014/main" id="{300F3ADE-9740-4B40-808F-7039CDA28D5E}"/>
+              </a:ext>
+            </a:extLst>
+          </p:cNvPr>
+          <p:cNvSpPr txBox="1"/>
+          <p:nvPr/>
+        </p:nvSpPr>
+        <p:spPr>
+          <a:xfrm>
+            <a:off x="838200" y="5948313"/>
+            <a:ext cx="4676480" cy="369332"/>
+          </a:xfrm>
+          <a:prstGeom prst="rect">
+            <a:avLst/>
+          </a:prstGeom>
+          <a:noFill/>
+        </p:spPr>
+        <p:txBody>
+          <a:bodyPr wrap="square" rtlCol="0">
+            <a:spAutoFit/>
+          </a:bodyPr>
+          <a:lstStyle/>
+          <a:p>
+            <a:pPr algn="ctr"/>
+            <a:r>
+              <a:rPr lang="ru-RU" dirty="0"/>
+              <a:t>Модуль внутреннего представления текста</a:t>
+            </a:r>
+          </a:p>
+        </p:txBody>
+      </p:sp>
+      <p:pic>
+        <p:nvPicPr>
+          <p:cNvPr id="11" name="Рисунок 10" descr="Изображение выглядит как снимок экрана&#10;&#10;Автоматически созданное описание">
+            <a:extLst>
+              <a:ext uri="{FF2B5EF4-FFF2-40B4-BE49-F238E27FC236}">
+                <a16:creationId xmlns:a16="http://schemas.microsoft.com/office/drawing/2014/main" id="{8B687AC6-76E7-449F-BBEE-14600AD9E1F3}"/>
+              </a:ext>
+            </a:extLst>
+          </p:cNvPr>
+          <p:cNvPicPr>
+            <a:picLocks noChangeAspect="1"/>
+          </p:cNvPicPr>
+          <p:nvPr/>
+        </p:nvPicPr>
+        <p:blipFill>
+          <a:blip r:embed="rId3">
+            <a:extLst>
+              <a:ext uri="{28A0092B-C50C-407E-A947-70E740481C1C}">
+                <a14:useLocalDpi xmlns:a14="http://schemas.microsoft.com/office/drawing/2010/main" val="0"/>
+              </a:ext>
+            </a:extLst>
+          </a:blip>
+          <a:stretch>
+            <a:fillRect/>
+          </a:stretch>
+        </p:blipFill>
+        <p:spPr>
+          <a:xfrm>
+            <a:off x="6095999" y="1831097"/>
+            <a:ext cx="5343525" cy="2295525"/>
+          </a:xfrm>
+          <a:prstGeom prst="rect">
+            <a:avLst/>
+          </a:prstGeom>
+        </p:spPr>
+      </p:pic>
+      <p:sp>
+        <p:nvSpPr>
+          <p:cNvPr id="12" name="TextBox 11">
+            <a:extLst>
+              <a:ext uri="{FF2B5EF4-FFF2-40B4-BE49-F238E27FC236}">
+                <a16:creationId xmlns:a16="http://schemas.microsoft.com/office/drawing/2014/main" id="{AD90E171-D787-45B8-9E69-79CCFC75535A}"/>
+              </a:ext>
+            </a:extLst>
+          </p:cNvPr>
+          <p:cNvSpPr txBox="1"/>
+          <p:nvPr/>
+        </p:nvSpPr>
+        <p:spPr>
+          <a:xfrm>
+            <a:off x="6095999" y="4270342"/>
+            <a:ext cx="5343525" cy="369332"/>
+          </a:xfrm>
+          <a:prstGeom prst="rect">
+            <a:avLst/>
+          </a:prstGeom>
+          <a:noFill/>
+        </p:spPr>
+        <p:txBody>
+          <a:bodyPr wrap="square" rtlCol="0">
+            <a:spAutoFit/>
+          </a:bodyPr>
+          <a:lstStyle/>
+          <a:p>
+            <a:pPr algn="ctr"/>
+            <a:r>
+              <a:rPr lang="ru-RU" dirty="0"/>
+              <a:t>Модуль отрисовки</a:t>
+            </a:r>
+          </a:p>
+        </p:txBody>
+      </p:sp>
+      <p:pic>
+        <p:nvPicPr>
+          <p:cNvPr id="15" name="Рисунок 14" descr="Изображение выглядит как снимок экрана&#10;&#10;Автоматически созданное описание">
+            <a:extLst>
+              <a:ext uri="{FF2B5EF4-FFF2-40B4-BE49-F238E27FC236}">
+                <a16:creationId xmlns:a16="http://schemas.microsoft.com/office/drawing/2014/main" id="{A64141AF-9E8F-4ACC-A2E0-915F394826CF}"/>
+              </a:ext>
+            </a:extLst>
+          </p:cNvPr>
+          <p:cNvPicPr>
+            <a:picLocks noChangeAspect="1"/>
+          </p:cNvPicPr>
+          <p:nvPr/>
+        </p:nvPicPr>
+        <p:blipFill>
+          <a:blip r:embed="rId4">
+            <a:extLst>
+              <a:ext uri="{28A0092B-C50C-407E-A947-70E740481C1C}">
+                <a14:useLocalDpi xmlns:a14="http://schemas.microsoft.com/office/drawing/2010/main" val="0"/>
+              </a:ext>
+            </a:extLst>
+          </a:blip>
+          <a:stretch>
+            <a:fillRect/>
+          </a:stretch>
+        </p:blipFill>
+        <p:spPr>
+          <a:xfrm>
+            <a:off x="7177087" y="4783394"/>
+            <a:ext cx="2867025" cy="1057275"/>
+          </a:xfrm>
+          <a:prstGeom prst="rect">
+            <a:avLst/>
+          </a:prstGeom>
+        </p:spPr>
+      </p:pic>
+      <p:sp>
+        <p:nvSpPr>
+          <p:cNvPr id="16" name="TextBox 15">
+            <a:extLst>
+              <a:ext uri="{FF2B5EF4-FFF2-40B4-BE49-F238E27FC236}">
+                <a16:creationId xmlns:a16="http://schemas.microsoft.com/office/drawing/2014/main" id="{5BE9A398-BC40-4F02-9DF8-3150F9F29105}"/>
+              </a:ext>
+            </a:extLst>
+          </p:cNvPr>
+          <p:cNvSpPr txBox="1"/>
+          <p:nvPr/>
+        </p:nvSpPr>
+        <p:spPr>
+          <a:xfrm>
+            <a:off x="6717383" y="5989593"/>
+            <a:ext cx="3786431" cy="369332"/>
+          </a:xfrm>
+          <a:prstGeom prst="rect">
+            <a:avLst/>
+          </a:prstGeom>
+          <a:noFill/>
+        </p:spPr>
+        <p:txBody>
+          <a:bodyPr wrap="square" rtlCol="0">
+            <a:spAutoFit/>
+          </a:bodyPr>
+          <a:lstStyle/>
+          <a:p>
+            <a:pPr algn="ctr"/>
+            <a:r>
+              <a:rPr lang="ru-RU" dirty="0"/>
+              <a:t>Модуль пользовательского ввода</a:t>
+            </a:r>
           </a:p>
         </p:txBody>
       </p:sp>
@@ -5017,7 +5756,7 @@
           <a:p>
             <a:r>
               <a:rPr lang="en-US" dirty="0"/>
-              <a:t>Piece Tree</a:t>
+              <a:t>Piece Table</a:t>
             </a:r>
             <a:endParaRPr lang="ru-RU" dirty="0"/>
           </a:p>
@@ -5025,18 +5764,18 @@
       </p:sp>
       <p:sp>
         <p:nvSpPr>
-          <p:cNvPr id="3" name="Объект 2">
-            <a:extLst>
-              <a:ext uri="{FF2B5EF4-FFF2-40B4-BE49-F238E27FC236}">
-                <a16:creationId xmlns:a16="http://schemas.microsoft.com/office/drawing/2014/main" id="{D744C11E-DD85-4E6A-8A69-0A2C19180231}"/>
-              </a:ext>
-            </a:extLst>
-          </p:cNvPr>
-          <p:cNvSpPr>
-            <a:spLocks noGrp="1"/>
-          </p:cNvSpPr>
-          <p:nvPr>
-            <p:ph idx="1"/>
+          <p:cNvPr id="4" name="Номер слайда 3">
+            <a:extLst>
+              <a:ext uri="{FF2B5EF4-FFF2-40B4-BE49-F238E27FC236}">
+                <a16:creationId xmlns:a16="http://schemas.microsoft.com/office/drawing/2014/main" id="{47B496CE-3E3E-43C8-B385-B58C0FF6CA3E}"/>
+              </a:ext>
+            </a:extLst>
+          </p:cNvPr>
+          <p:cNvSpPr>
+            <a:spLocks noGrp="1"/>
+          </p:cNvSpPr>
+          <p:nvPr>
+            <p:ph type="sldNum" sz="quarter" idx="12"/>
           </p:nvPr>
         </p:nvSpPr>
         <p:spPr/>
@@ -5044,43 +5783,11 @@
           <a:bodyPr/>
           <a:lstStyle/>
           <a:p>
-            <a:pPr marL="0" indent="0">
-              <a:buNone/>
-            </a:pPr>
-            <a:r>
-              <a:rPr lang="en-US" dirty="0"/>
-              <a:t>Piece Tree = Piece Table + Splay Tree</a:t>
-            </a:r>
-            <a:endParaRPr lang="ru-RU" dirty="0"/>
-          </a:p>
-        </p:txBody>
-      </p:sp>
-      <p:sp>
-        <p:nvSpPr>
-          <p:cNvPr id="4" name="Номер слайда 3">
-            <a:extLst>
-              <a:ext uri="{FF2B5EF4-FFF2-40B4-BE49-F238E27FC236}">
-                <a16:creationId xmlns:a16="http://schemas.microsoft.com/office/drawing/2014/main" id="{47B496CE-3E3E-43C8-B385-B58C0FF6CA3E}"/>
-              </a:ext>
-            </a:extLst>
-          </p:cNvPr>
-          <p:cNvSpPr>
-            <a:spLocks noGrp="1"/>
-          </p:cNvSpPr>
-          <p:nvPr>
-            <p:ph type="sldNum" sz="quarter" idx="12"/>
-          </p:nvPr>
-        </p:nvSpPr>
-        <p:spPr/>
-        <p:txBody>
-          <a:bodyPr/>
-          <a:lstStyle/>
-          <a:p>
             <a:fld id="{02C6BDC3-5530-4FFE-B683-8EB0AAFDF752}" type="slidenum">
-              <a:rPr lang="ru-RU" smtClean="0"/>
+              <a:rPr lang="ru-RU" sz="1800" smtClean="0"/>
               <a:t>8</a:t>
             </a:fld>
-            <a:endParaRPr lang="ru-RU"/>
+            <a:endParaRPr lang="ru-RU" sz="1800" dirty="0"/>
           </a:p>
         </p:txBody>
       </p:sp>
@@ -5112,7 +5819,7 @@
         </p:blipFill>
         <p:spPr>
           <a:xfrm>
-            <a:off x="2242226" y="2363362"/>
+            <a:off x="2242226" y="1958762"/>
             <a:ext cx="7707548" cy="4129513"/>
           </a:xfrm>
           <a:prstGeom prst="rect">
@@ -5155,7 +5862,7 @@
           <p:cNvPr id="2" name="Заголовок 1">
             <a:extLst>
               <a:ext uri="{FF2B5EF4-FFF2-40B4-BE49-F238E27FC236}">
-                <a16:creationId xmlns:a16="http://schemas.microsoft.com/office/drawing/2014/main" id="{0B36A752-C373-491B-8950-FD706736ECAA}"/>
+                <a16:creationId xmlns:a16="http://schemas.microsoft.com/office/drawing/2014/main" id="{2D6B6CBF-9B98-4A26-8D9D-B69F25245264}"/>
               </a:ext>
             </a:extLst>
           </p:cNvPr>
@@ -5172,9 +5879,10 @@
           <a:lstStyle/>
           <a:p>
             <a:r>
-              <a:rPr lang="ru-RU" dirty="0"/>
-              <a:t>Интерфейс</a:t>
-            </a:r>
+              <a:rPr lang="en-US" dirty="0"/>
+              <a:t>Splay Tree</a:t>
+            </a:r>
+            <a:endParaRPr lang="ru-RU" dirty="0"/>
           </a:p>
         </p:txBody>
       </p:sp>
@@ -5183,7 +5891,7 @@
           <p:cNvPr id="4" name="Номер слайда 3">
             <a:extLst>
               <a:ext uri="{FF2B5EF4-FFF2-40B4-BE49-F238E27FC236}">
-                <a16:creationId xmlns:a16="http://schemas.microsoft.com/office/drawing/2014/main" id="{9B87D21D-A744-4FF5-B980-1AB1D28400E1}"/>
+                <a16:creationId xmlns:a16="http://schemas.microsoft.com/office/drawing/2014/main" id="{BEE83FE5-F556-4A69-9C71-2859E9316D7E}"/>
               </a:ext>
             </a:extLst>
           </p:cNvPr>
@@ -5200,39 +5908,43 @@
           <a:lstStyle/>
           <a:p>
             <a:fld id="{02C6BDC3-5530-4FFE-B683-8EB0AAFDF752}" type="slidenum">
-              <a:rPr lang="ru-RU" smtClean="0"/>
+              <a:rPr lang="ru-RU" sz="1800" smtClean="0"/>
               <a:t>9</a:t>
             </a:fld>
-            <a:endParaRPr lang="ru-RU"/>
+            <a:endParaRPr lang="ru-RU" sz="1800" dirty="0"/>
           </a:p>
         </p:txBody>
       </p:sp>
       <p:pic>
         <p:nvPicPr>
-          <p:cNvPr id="5" name="Объект 4">
-            <a:extLst>
-              <a:ext uri="{FF2B5EF4-FFF2-40B4-BE49-F238E27FC236}">
-                <a16:creationId xmlns:a16="http://schemas.microsoft.com/office/drawing/2014/main" id="{471ED944-A540-4197-B1B0-A30CE41339FD}"/>
+          <p:cNvPr id="6" name="Рисунок 5">
+            <a:extLst>
+              <a:ext uri="{FF2B5EF4-FFF2-40B4-BE49-F238E27FC236}">
+                <a16:creationId xmlns:a16="http://schemas.microsoft.com/office/drawing/2014/main" id="{05ACC86E-AB43-4E95-A8DD-7062AA4E1DED}"/>
               </a:ext>
             </a:extLst>
           </p:cNvPr>
           <p:cNvPicPr>
-            <a:picLocks noGrp="1" noChangeAspect="1"/>
+            <a:picLocks noChangeAspect="1"/>
           </p:cNvPicPr>
-          <p:nvPr>
-            <p:ph idx="1"/>
-          </p:nvPr>
+          <p:nvPr/>
         </p:nvPicPr>
         <p:blipFill>
-          <a:blip r:embed="rId2"/>
+          <a:blip r:embed="rId2">
+            <a:extLst>
+              <a:ext uri="{28A0092B-C50C-407E-A947-70E740481C1C}">
+                <a14:useLocalDpi xmlns:a14="http://schemas.microsoft.com/office/drawing/2010/main" val="0"/>
+              </a:ext>
+            </a:extLst>
+          </a:blip>
           <a:stretch>
             <a:fillRect/>
           </a:stretch>
         </p:blipFill>
         <p:spPr>
           <a:xfrm>
-            <a:off x="2243580" y="1782233"/>
-            <a:ext cx="7595912" cy="4375376"/>
+            <a:off x="380505" y="1690688"/>
+            <a:ext cx="11430990" cy="4287891"/>
           </a:xfrm>
           <a:prstGeom prst="rect">
             <a:avLst/>
@@ -5242,7 +5954,7 @@
     </p:spTree>
     <p:extLst>
       <p:ext uri="{BB962C8B-B14F-4D97-AF65-F5344CB8AC3E}">
-        <p14:creationId xmlns:p14="http://schemas.microsoft.com/office/powerpoint/2010/main" val="767467962"/>
+        <p14:creationId xmlns:p14="http://schemas.microsoft.com/office/powerpoint/2010/main" val="4086031287"/>
       </p:ext>
     </p:extLst>
   </p:cSld>

</xml_diff>